<commit_message>
Change AFD to AFDB
</commit_message>
<xml_diff>
--- a/src/HBB-did-uri-spec-coexistence v0.22.pptx
+++ b/src/HBB-did-uri-spec-coexistence v0.22.pptx
@@ -798,10 +798,25 @@
   <pc:docChgLst>
     <pc:chgData name="Michael Herman" userId="844217e249c738f3" providerId="LiveId" clId="{3CDF35B0-D7B9-47A9-969A-2D8D4DBF1216}"/>
     <pc:docChg chg="custSel modSld">
-      <pc:chgData name="Michael Herman" userId="844217e249c738f3" providerId="LiveId" clId="{3CDF35B0-D7B9-47A9-969A-2D8D4DBF1216}" dt="2019-04-01T20:22:45.451" v="22" actId="20577"/>
+      <pc:chgData name="Michael Herman" userId="844217e249c738f3" providerId="LiveId" clId="{3CDF35B0-D7B9-47A9-969A-2D8D4DBF1216}" dt="2019-04-01T23:44:29.082" v="23" actId="20577"/>
       <pc:docMkLst>
         <pc:docMk/>
       </pc:docMkLst>
+      <pc:sldChg chg="modSp">
+        <pc:chgData name="Michael Herman" userId="844217e249c738f3" providerId="LiveId" clId="{3CDF35B0-D7B9-47A9-969A-2D8D4DBF1216}" dt="2019-04-01T23:44:29.082" v="23" actId="20577"/>
+        <pc:sldMkLst>
+          <pc:docMk/>
+          <pc:sldMk cId="2083037267" sldId="666"/>
+        </pc:sldMkLst>
+        <pc:spChg chg="mod">
+          <ac:chgData name="Michael Herman" userId="844217e249c738f3" providerId="LiveId" clId="{3CDF35B0-D7B9-47A9-969A-2D8D4DBF1216}" dt="2019-04-01T23:44:29.082" v="23" actId="20577"/>
+          <ac:spMkLst>
+            <pc:docMk/>
+            <pc:sldMk cId="2083037267" sldId="666"/>
+            <ac:spMk id="65" creationId="{B1234F0B-643B-41D9-99B3-F048DDA1F058}"/>
+          </ac:spMkLst>
+        </pc:spChg>
+      </pc:sldChg>
       <pc:sldChg chg="modSp">
         <pc:chgData name="Michael Herman" userId="844217e249c738f3" providerId="LiveId" clId="{3CDF35B0-D7B9-47A9-969A-2D8D4DBF1216}" dt="2019-04-01T20:22:45.451" v="22" actId="20577"/>
         <pc:sldMkLst>
@@ -20694,7 +20709,11 @@
                 <a:pPr algn="ctr"/>
                 <a:r>
                   <a:rPr lang="en-CA" sz="3200" dirty="0"/>
-                  <a:t>Optimizer (AFD)</a:t>
+                  <a:t>Optimizer </a:t>
+                </a:r>
+                <a:r>
+                  <a:rPr lang="en-CA" sz="3200"/>
+                  <a:t>(AFDB)</a:t>
                 </a:r>
                 <a:endParaRPr lang="en-US" sz="3200" dirty="0"/>
               </a:p>

</xml_diff>